<commit_message>
adding resources section to heartblead presentation
</commit_message>
<xml_diff>
--- a/week2/week 2 - wednesday.pptx
+++ b/week2/week 2 - wednesday.pptx
@@ -14,6 +14,7 @@
     <p:sldId id="263" r:id="rId8"/>
     <p:sldId id="264" r:id="rId9"/>
     <p:sldId id="261" r:id="rId10"/>
+    <p:sldId id="265" r:id="rId11"/>
   </p:sldIdLst>
   <p:sldSz cx="9144000" cy="6858000" type="screen4x3"/>
   <p:notesSz cx="6858000" cy="9144000"/>
@@ -3175,6 +3176,125 @@
   <p:clrMapOvr>
     <a:masterClrMapping/>
   </p:clrMapOvr>
+  <p:timing>
+    <p:tnLst>
+      <p:par>
+        <p:cTn xmlns:p14="http://schemas.microsoft.com/office/powerpoint/2010/main" id="1" dur="indefinite" restart="never" nodeType="tmRoot"/>
+      </p:par>
+    </p:tnLst>
+  </p:timing>
+</p:sld>
+</file>
+
+<file path=ppt/slides/slide10.xml><?xml version="1.0" encoding="utf-8"?>
+<p:sld xmlns:a="http://schemas.openxmlformats.org/drawingml/2006/main" xmlns:r="http://schemas.openxmlformats.org/officeDocument/2006/relationships" xmlns:p="http://schemas.openxmlformats.org/presentationml/2006/main">
+  <p:cSld>
+    <p:spTree>
+      <p:nvGrpSpPr>
+        <p:cNvPr id="1" name=""/>
+        <p:cNvGrpSpPr/>
+        <p:nvPr/>
+      </p:nvGrpSpPr>
+      <p:grpSpPr>
+        <a:xfrm>
+          <a:off x="0" y="0"/>
+          <a:ext cx="0" cy="0"/>
+          <a:chOff x="0" y="0"/>
+          <a:chExt cx="0" cy="0"/>
+        </a:xfrm>
+      </p:grpSpPr>
+      <p:sp>
+        <p:nvSpPr>
+          <p:cNvPr id="2" name="Title 1"/>
+          <p:cNvSpPr>
+            <a:spLocks noGrp="1"/>
+          </p:cNvSpPr>
+          <p:nvPr>
+            <p:ph type="title"/>
+          </p:nvPr>
+        </p:nvSpPr>
+        <p:spPr/>
+        <p:txBody>
+          <a:bodyPr/>
+          <a:lstStyle/>
+          <a:p>
+            <a:r>
+              <a:rPr lang="en-US" dirty="0" smtClean="0"/>
+              <a:t>Resources</a:t>
+            </a:r>
+            <a:endParaRPr lang="en-US" dirty="0"/>
+          </a:p>
+        </p:txBody>
+      </p:sp>
+      <p:sp>
+        <p:nvSpPr>
+          <p:cNvPr id="3" name="Content Placeholder 2"/>
+          <p:cNvSpPr>
+            <a:spLocks noGrp="1"/>
+          </p:cNvSpPr>
+          <p:nvPr>
+            <p:ph idx="1"/>
+          </p:nvPr>
+        </p:nvSpPr>
+        <p:spPr/>
+        <p:txBody>
+          <a:bodyPr/>
+          <a:lstStyle/>
+          <a:p>
+            <a:r>
+              <a:rPr lang="en-US" dirty="0" smtClean="0">
+                <a:hlinkClick r:id="rId2"/>
+              </a:rPr>
+              <a:t>http://blog.cryptographyengineering.com/2014/04/attack-of-week-openssl-heartbleed.html</a:t>
+            </a:r>
+            <a:r>
+              <a:rPr lang="en-US" dirty="0" smtClean="0"/>
+              <a:t> </a:t>
+            </a:r>
+          </a:p>
+          <a:p>
+            <a:r>
+              <a:rPr lang="en-US" dirty="0" smtClean="0">
+                <a:hlinkClick r:id="rId3"/>
+              </a:rPr>
+              <a:t>http://blog.existentialize.com/diagnosis-of-the-openssl-heartbleed-bug.html</a:t>
+            </a:r>
+            <a:r>
+              <a:rPr lang="en-US" dirty="0" smtClean="0"/>
+              <a:t> </a:t>
+            </a:r>
+          </a:p>
+          <a:p>
+            <a:r>
+              <a:rPr lang="en-US" dirty="0" smtClean="0">
+                <a:hlinkClick r:id="rId4"/>
+              </a:rPr>
+              <a:t>https://tools.ietf.org</a:t>
+            </a:r>
+            <a:r>
+              <a:rPr lang="en-US" smtClean="0">
+                <a:hlinkClick r:id="rId4"/>
+              </a:rPr>
+              <a:t>/html/rfc6520#page-5</a:t>
+            </a:r>
+            <a:r>
+              <a:rPr lang="en-US" smtClean="0"/>
+              <a:t> </a:t>
+            </a:r>
+            <a:endParaRPr lang="en-US" dirty="0"/>
+          </a:p>
+        </p:txBody>
+      </p:sp>
+    </p:spTree>
+    <p:extLst>
+      <p:ext uri="{BB962C8B-B14F-4D97-AF65-F5344CB8AC3E}">
+        <p14:creationId xmlns:p14="http://schemas.microsoft.com/office/powerpoint/2010/main" val="1206390632"/>
+      </p:ext>
+    </p:extLst>
+  </p:cSld>
+  <p:clrMapOvr>
+    <a:masterClrMapping/>
+  </p:clrMapOvr>
 </p:sld>
 </file>
 
@@ -3303,6 +3423,13 @@
   <p:clrMapOvr>
     <a:masterClrMapping/>
   </p:clrMapOvr>
+  <p:timing>
+    <p:tnLst>
+      <p:par>
+        <p:cTn xmlns:p14="http://schemas.microsoft.com/office/powerpoint/2010/main" id="1" dur="indefinite" restart="never" nodeType="tmRoot"/>
+      </p:par>
+    </p:tnLst>
+  </p:timing>
 </p:sld>
 </file>
 
@@ -3397,6 +3524,13 @@
   <p:clrMapOvr>
     <a:masterClrMapping/>
   </p:clrMapOvr>
+  <p:timing>
+    <p:tnLst>
+      <p:par>
+        <p:cTn xmlns:p14="http://schemas.microsoft.com/office/powerpoint/2010/main" id="1" dur="indefinite" restart="never" nodeType="tmRoot"/>
+      </p:par>
+    </p:tnLst>
+  </p:timing>
 </p:sld>
 </file>
 
@@ -3451,6 +3585,13 @@
   <p:clrMapOvr>
     <a:masterClrMapping/>
   </p:clrMapOvr>
+  <p:timing>
+    <p:tnLst>
+      <p:par>
+        <p:cTn xmlns:p14="http://schemas.microsoft.com/office/powerpoint/2010/main" id="1" dur="indefinite" restart="never" nodeType="tmRoot"/>
+      </p:par>
+    </p:tnLst>
+  </p:timing>
 </p:sld>
 </file>
 
@@ -3527,6 +3668,13 @@
   <p:clrMapOvr>
     <a:masterClrMapping/>
   </p:clrMapOvr>
+  <p:timing>
+    <p:tnLst>
+      <p:par>
+        <p:cTn xmlns:p14="http://schemas.microsoft.com/office/powerpoint/2010/main" id="1" dur="indefinite" restart="never" nodeType="tmRoot"/>
+      </p:par>
+    </p:tnLst>
+  </p:timing>
 </p:sld>
 </file>
 
@@ -3771,6 +3919,13 @@
   <p:clrMapOvr>
     <a:masterClrMapping/>
   </p:clrMapOvr>
+  <p:timing>
+    <p:tnLst>
+      <p:par>
+        <p:cTn xmlns:p14="http://schemas.microsoft.com/office/powerpoint/2010/main" id="1" dur="indefinite" restart="never" nodeType="tmRoot"/>
+      </p:par>
+    </p:tnLst>
+  </p:timing>
 </p:sld>
 </file>
 
@@ -3852,11 +4007,7 @@
           <a:p>
             <a:r>
               <a:rPr lang="en-US" dirty="0" smtClean="0"/>
-              <a:t>Attacker reports longer length then payload, server then replies with payload + extra info from </a:t>
-            </a:r>
-            <a:r>
-              <a:rPr lang="en-US" smtClean="0"/>
-              <a:t>adjacent memory</a:t>
+              <a:t>Attacker reports longer length then payload, server then replies with payload + extra info from adjacent memory</a:t>
             </a:r>
             <a:endParaRPr lang="en-US" dirty="0"/>
           </a:p>
@@ -3872,6 +4023,13 @@
   <p:clrMapOvr>
     <a:masterClrMapping/>
   </p:clrMapOvr>
+  <p:timing>
+    <p:tnLst>
+      <p:par>
+        <p:cTn xmlns:p14="http://schemas.microsoft.com/office/powerpoint/2010/main" id="1" dur="indefinite" restart="never" nodeType="tmRoot"/>
+      </p:par>
+    </p:tnLst>
+  </p:timing>
 </p:sld>
 </file>
 
@@ -3988,6 +4146,13 @@
   <p:clrMapOvr>
     <a:masterClrMapping/>
   </p:clrMapOvr>
+  <p:timing>
+    <p:tnLst>
+      <p:par>
+        <p:cTn xmlns:p14="http://schemas.microsoft.com/office/powerpoint/2010/main" id="1" dur="indefinite" restart="never" nodeType="tmRoot"/>
+      </p:par>
+    </p:tnLst>
+  </p:timing>
 </p:sld>
 </file>
 
@@ -4084,6 +4249,13 @@
   <p:clrMapOvr>
     <a:masterClrMapping/>
   </p:clrMapOvr>
+  <p:timing>
+    <p:tnLst>
+      <p:par>
+        <p:cTn xmlns:p14="http://schemas.microsoft.com/office/powerpoint/2010/main" id="1" dur="indefinite" restart="never" nodeType="tmRoot"/>
+      </p:par>
+    </p:tnLst>
+  </p:timing>
 </p:sld>
 </file>
 

</xml_diff>